<commit_message>
Opraveny chyby názvu týmu
</commit_message>
<xml_diff>
--- a/Dokumenty/Oponentura/Hodnocení týmu Kostello.pptx
+++ b/Dokumenty/Oponentura/Hodnocení týmu Kostello.pptx
@@ -271,7 +271,7 @@
           <a:p>
             <a:fld id="{D2E516DC-ACFF-48C5-9163-A08D76B2D730}" type="datetimeFigureOut">
               <a:rPr lang="cs-CZ" smtClean="0"/>
-              <a:t>08.01.2021</a:t>
+              <a:t>09.01.2021</a:t>
             </a:fld>
             <a:endParaRPr lang="cs-CZ"/>
           </a:p>
@@ -469,7 +469,7 @@
           <a:p>
             <a:fld id="{D2E516DC-ACFF-48C5-9163-A08D76B2D730}" type="datetimeFigureOut">
               <a:rPr lang="cs-CZ" smtClean="0"/>
-              <a:t>08.01.2021</a:t>
+              <a:t>09.01.2021</a:t>
             </a:fld>
             <a:endParaRPr lang="cs-CZ"/>
           </a:p>
@@ -677,7 +677,7 @@
           <a:p>
             <a:fld id="{D2E516DC-ACFF-48C5-9163-A08D76B2D730}" type="datetimeFigureOut">
               <a:rPr lang="cs-CZ" smtClean="0"/>
-              <a:t>08.01.2021</a:t>
+              <a:t>09.01.2021</a:t>
             </a:fld>
             <a:endParaRPr lang="cs-CZ"/>
           </a:p>
@@ -875,7 +875,7 @@
           <a:p>
             <a:fld id="{D2E516DC-ACFF-48C5-9163-A08D76B2D730}" type="datetimeFigureOut">
               <a:rPr lang="cs-CZ" smtClean="0"/>
-              <a:t>08.01.2021</a:t>
+              <a:t>09.01.2021</a:t>
             </a:fld>
             <a:endParaRPr lang="cs-CZ"/>
           </a:p>
@@ -1150,7 +1150,7 @@
           <a:p>
             <a:fld id="{D2E516DC-ACFF-48C5-9163-A08D76B2D730}" type="datetimeFigureOut">
               <a:rPr lang="cs-CZ" smtClean="0"/>
-              <a:t>08.01.2021</a:t>
+              <a:t>09.01.2021</a:t>
             </a:fld>
             <a:endParaRPr lang="cs-CZ"/>
           </a:p>
@@ -1415,7 +1415,7 @@
           <a:p>
             <a:fld id="{D2E516DC-ACFF-48C5-9163-A08D76B2D730}" type="datetimeFigureOut">
               <a:rPr lang="cs-CZ" smtClean="0"/>
-              <a:t>08.01.2021</a:t>
+              <a:t>09.01.2021</a:t>
             </a:fld>
             <a:endParaRPr lang="cs-CZ"/>
           </a:p>
@@ -1827,7 +1827,7 @@
           <a:p>
             <a:fld id="{D2E516DC-ACFF-48C5-9163-A08D76B2D730}" type="datetimeFigureOut">
               <a:rPr lang="cs-CZ" smtClean="0"/>
-              <a:t>08.01.2021</a:t>
+              <a:t>09.01.2021</a:t>
             </a:fld>
             <a:endParaRPr lang="cs-CZ"/>
           </a:p>
@@ -1968,7 +1968,7 @@
           <a:p>
             <a:fld id="{D2E516DC-ACFF-48C5-9163-A08D76B2D730}" type="datetimeFigureOut">
               <a:rPr lang="cs-CZ" smtClean="0"/>
-              <a:t>08.01.2021</a:t>
+              <a:t>09.01.2021</a:t>
             </a:fld>
             <a:endParaRPr lang="cs-CZ"/>
           </a:p>
@@ -2081,7 +2081,7 @@
           <a:p>
             <a:fld id="{D2E516DC-ACFF-48C5-9163-A08D76B2D730}" type="datetimeFigureOut">
               <a:rPr lang="cs-CZ" smtClean="0"/>
-              <a:t>08.01.2021</a:t>
+              <a:t>09.01.2021</a:t>
             </a:fld>
             <a:endParaRPr lang="cs-CZ"/>
           </a:p>
@@ -2392,7 +2392,7 @@
           <a:p>
             <a:fld id="{D2E516DC-ACFF-48C5-9163-A08D76B2D730}" type="datetimeFigureOut">
               <a:rPr lang="cs-CZ" smtClean="0"/>
-              <a:t>08.01.2021</a:t>
+              <a:t>09.01.2021</a:t>
             </a:fld>
             <a:endParaRPr lang="cs-CZ"/>
           </a:p>
@@ -2680,7 +2680,7 @@
           <a:p>
             <a:fld id="{D2E516DC-ACFF-48C5-9163-A08D76B2D730}" type="datetimeFigureOut">
               <a:rPr lang="cs-CZ" smtClean="0"/>
-              <a:t>08.01.2021</a:t>
+              <a:t>09.01.2021</a:t>
             </a:fld>
             <a:endParaRPr lang="cs-CZ"/>
           </a:p>
@@ -2921,7 +2921,7 @@
           <a:p>
             <a:fld id="{D2E516DC-ACFF-48C5-9163-A08D76B2D730}" type="datetimeFigureOut">
               <a:rPr lang="cs-CZ" smtClean="0"/>
-              <a:t>08.01.2021</a:t>
+              <a:t>09.01.2021</a:t>
             </a:fld>
             <a:endParaRPr lang="cs-CZ"/>
           </a:p>
@@ -4117,7 +4117,7 @@
                   <a:srgbClr val="3F3F3F"/>
                 </a:solidFill>
               </a:rPr>
-              <a:t>Kvalita:</a:t>
+              <a:t>Kvalita: 4</a:t>
             </a:r>
           </a:p>
         </p:txBody>
@@ -4541,8 +4541,35 @@
                   <a:srgbClr val="3F3F3F"/>
                 </a:solidFill>
               </a:rPr>
-              <a:t>Uživatelská a administrátorská dokumentace:</a:t>
-            </a:r>
+              <a:t>Uživatelská dokumentace: 2</a:t>
+            </a:r>
+            <a:br>
+              <a:rPr lang="cs-CZ" dirty="0">
+                <a:solidFill>
+                  <a:srgbClr val="3F3F3F"/>
+                </a:solidFill>
+              </a:rPr>
+            </a:br>
+            <a:br>
+              <a:rPr lang="cs-CZ" dirty="0">
+                <a:solidFill>
+                  <a:srgbClr val="3F3F3F"/>
+                </a:solidFill>
+              </a:rPr>
+            </a:br>
+            <a:r>
+              <a:rPr lang="cs-CZ">
+                <a:solidFill>
+                  <a:srgbClr val="3F3F3F"/>
+                </a:solidFill>
+              </a:rPr>
+              <a:t>Administrátorská dokumentace: 5</a:t>
+            </a:r>
+            <a:endParaRPr lang="cs-CZ" dirty="0">
+              <a:solidFill>
+                <a:srgbClr val="3F3F3F"/>
+              </a:solidFill>
+            </a:endParaRPr>
           </a:p>
         </p:txBody>
       </p:sp>
@@ -7074,7 +7101,7 @@
                   <a:srgbClr val="3F3F3F"/>
                 </a:solidFill>
               </a:rPr>
-              <a:t>Úplnost podkladů:</a:t>
+              <a:t>Úplnost podkladů: 3</a:t>
             </a:r>
           </a:p>
         </p:txBody>
@@ -7508,7 +7535,7 @@
                   <a:srgbClr val="3F3F3F"/>
                 </a:solidFill>
               </a:rPr>
-              <a:t>Rozsah předané funkčnosti:</a:t>
+              <a:t>Rozsah předané funkčnosti: 4</a:t>
             </a:r>
           </a:p>
         </p:txBody>
@@ -7950,7 +7977,7 @@
                   <a:srgbClr val="3F3F3F"/>
                 </a:solidFill>
               </a:rPr>
-              <a:t>Uživatelská přívětivost:</a:t>
+              <a:t>Uživatelská přívětivost: 3</a:t>
             </a:r>
           </a:p>
         </p:txBody>
@@ -8362,7 +8389,7 @@
                   <a:srgbClr val="3F3F3F"/>
                 </a:solidFill>
               </a:rPr>
-              <a:t>Chyby:</a:t>
+              <a:t>Chyby: 4</a:t>
             </a:r>
           </a:p>
         </p:txBody>
@@ -8809,7 +8836,7 @@
                   <a:srgbClr val="3F3F3F"/>
                 </a:solidFill>
               </a:rPr>
-              <a:t>Informační hodnota:</a:t>
+              <a:t>Informační hodnota: 4</a:t>
             </a:r>
           </a:p>
         </p:txBody>

</xml_diff>